<commit_message>
Update Introductory Concepts in R.pptx
</commit_message>
<xml_diff>
--- a/Beginner Workshop/Introductory Concepts in R.pptx
+++ b/Beginner Workshop/Introductory Concepts in R.pptx
@@ -8,6 +8,11 @@
     <p:sldId id="256" r:id="rId2"/>
     <p:sldId id="257" r:id="rId3"/>
     <p:sldId id="258" r:id="rId4"/>
+    <p:sldId id="259" r:id="rId5"/>
+    <p:sldId id="260" r:id="rId6"/>
+    <p:sldId id="261" r:id="rId7"/>
+    <p:sldId id="262" r:id="rId8"/>
+    <p:sldId id="263" r:id="rId9"/>
   </p:sldIdLst>
   <p:sldSz cx="12192000" cy="6858000"/>
   <p:notesSz cx="6858000" cy="9144000"/>
@@ -106,6 +111,51 @@
       </a:defRPr>
     </a:lvl9pPr>
   </p:defaultTextStyle>
+  <p:extLst>
+    <p:ext uri="{521415D9-36F7-43E2-AB2F-B90AF26B5E84}">
+      <p14:sectionLst xmlns:p14="http://schemas.microsoft.com/office/powerpoint/2010/main">
+        <p14:section name="Default Section" id="{29E2A5D3-01C8-4E0C-8109-74F2903C83D5}">
+          <p14:sldIdLst>
+            <p14:sldId id="256"/>
+            <p14:sldId id="257"/>
+          </p14:sldIdLst>
+        </p14:section>
+        <p14:section name="R Projects and R Markdown" id="{EBAC49C4-D09F-419A-84A3-E7C1A9FF55D0}">
+          <p14:sldIdLst>
+            <p14:sldId id="258"/>
+          </p14:sldIdLst>
+        </p14:section>
+        <p14:section name="Principles of Clean Coding" id="{4FEAD148-0483-4865-B4F3-57C236E15355}">
+          <p14:sldIdLst>
+            <p14:sldId id="259"/>
+          </p14:sldIdLst>
+        </p14:section>
+        <p14:section name="Finding Help" id="{E70C57F1-D4D0-4A5F-B422-7EC6CFE09FDB}">
+          <p14:sldIdLst>
+            <p14:sldId id="260"/>
+          </p14:sldIdLst>
+        </p14:section>
+        <p14:section name="Common Mistakes" id="{192603A6-0979-4324-AF09-6720654E1F2B}">
+          <p14:sldIdLst>
+            <p14:sldId id="261"/>
+          </p14:sldIdLst>
+        </p14:section>
+        <p14:section name="Error Interpretation" id="{FB7A2C02-7B90-4864-BEBA-5A290269CD1E}">
+          <p14:sldIdLst>
+            <p14:sldId id="262"/>
+          </p14:sldIdLst>
+        </p14:section>
+        <p14:section name="Resources" id="{0E96B1A4-2441-41EC-AD5D-D14B47B3E824}">
+          <p14:sldIdLst>
+            <p14:sldId id="263"/>
+          </p14:sldIdLst>
+        </p14:section>
+      </p14:sectionLst>
+    </p:ext>
+    <p:ext uri="{EFAFB233-063F-42B5-8137-9DF3F51BA10A}">
+      <p15:sldGuideLst xmlns:p15="http://schemas.microsoft.com/office/powerpoint/2012/main"/>
+    </p:ext>
+  </p:extLst>
 </p:presentation>
 </file>
 
@@ -3589,6 +3639,549 @@
 </p:sld>
 </file>
 
+<file path=ppt/slides/slide4.xml><?xml version="1.0" encoding="utf-8"?>
+<p:sld xmlns:a="http://schemas.openxmlformats.org/drawingml/2006/main" xmlns:r="http://schemas.openxmlformats.org/officeDocument/2006/relationships" xmlns:p="http://schemas.openxmlformats.org/presentationml/2006/main">
+  <p:cSld>
+    <p:spTree>
+      <p:nvGrpSpPr>
+        <p:cNvPr id="1" name=""/>
+        <p:cNvGrpSpPr/>
+        <p:nvPr/>
+      </p:nvGrpSpPr>
+      <p:grpSpPr>
+        <a:xfrm>
+          <a:off x="0" y="0"/>
+          <a:ext cx="0" cy="0"/>
+          <a:chOff x="0" y="0"/>
+          <a:chExt cx="0" cy="0"/>
+        </a:xfrm>
+      </p:grpSpPr>
+      <p:sp>
+        <p:nvSpPr>
+          <p:cNvPr id="2" name="Title 1">
+            <a:extLst>
+              <a:ext uri="{FF2B5EF4-FFF2-40B4-BE49-F238E27FC236}">
+                <a16:creationId xmlns:a16="http://schemas.microsoft.com/office/drawing/2014/main" id="{D084B736-440B-42AD-970B-6E335B51E270}"/>
+              </a:ext>
+            </a:extLst>
+          </p:cNvPr>
+          <p:cNvSpPr>
+            <a:spLocks noGrp="1"/>
+          </p:cNvSpPr>
+          <p:nvPr>
+            <p:ph type="title"/>
+          </p:nvPr>
+        </p:nvSpPr>
+        <p:spPr/>
+        <p:txBody>
+          <a:bodyPr/>
+          <a:lstStyle/>
+          <a:p>
+            <a:r>
+              <a:rPr lang="en-CA" dirty="0"/>
+              <a:t>Principles of Clean Coding</a:t>
+            </a:r>
+            <a:endParaRPr lang="en-US" dirty="0"/>
+          </a:p>
+        </p:txBody>
+      </p:sp>
+      <p:sp>
+        <p:nvSpPr>
+          <p:cNvPr id="3" name="Content Placeholder 2">
+            <a:extLst>
+              <a:ext uri="{FF2B5EF4-FFF2-40B4-BE49-F238E27FC236}">
+                <a16:creationId xmlns:a16="http://schemas.microsoft.com/office/drawing/2014/main" id="{FBFB55E0-2F63-437C-8FA7-8AD34C79A8E3}"/>
+              </a:ext>
+            </a:extLst>
+          </p:cNvPr>
+          <p:cNvSpPr>
+            <a:spLocks noGrp="1"/>
+          </p:cNvSpPr>
+          <p:nvPr>
+            <p:ph idx="1"/>
+          </p:nvPr>
+        </p:nvSpPr>
+        <p:spPr/>
+        <p:txBody>
+          <a:bodyPr/>
+          <a:lstStyle/>
+          <a:p>
+            <a:endParaRPr lang="en-US"/>
+          </a:p>
+        </p:txBody>
+      </p:sp>
+    </p:spTree>
+    <p:extLst>
+      <p:ext uri="{BB962C8B-B14F-4D97-AF65-F5344CB8AC3E}">
+        <p14:creationId xmlns:p14="http://schemas.microsoft.com/office/powerpoint/2010/main" val="2060947819"/>
+      </p:ext>
+    </p:extLst>
+  </p:cSld>
+  <p:clrMapOvr>
+    <a:masterClrMapping/>
+  </p:clrMapOvr>
+</p:sld>
+</file>
+
+<file path=ppt/slides/slide5.xml><?xml version="1.0" encoding="utf-8"?>
+<p:sld xmlns:a="http://schemas.openxmlformats.org/drawingml/2006/main" xmlns:r="http://schemas.openxmlformats.org/officeDocument/2006/relationships" xmlns:p="http://schemas.openxmlformats.org/presentationml/2006/main">
+  <p:cSld>
+    <p:spTree>
+      <p:nvGrpSpPr>
+        <p:cNvPr id="1" name=""/>
+        <p:cNvGrpSpPr/>
+        <p:nvPr/>
+      </p:nvGrpSpPr>
+      <p:grpSpPr>
+        <a:xfrm>
+          <a:off x="0" y="0"/>
+          <a:ext cx="0" cy="0"/>
+          <a:chOff x="0" y="0"/>
+          <a:chExt cx="0" cy="0"/>
+        </a:xfrm>
+      </p:grpSpPr>
+      <p:sp>
+        <p:nvSpPr>
+          <p:cNvPr id="2" name="Title 1">
+            <a:extLst>
+              <a:ext uri="{FF2B5EF4-FFF2-40B4-BE49-F238E27FC236}">
+                <a16:creationId xmlns:a16="http://schemas.microsoft.com/office/drawing/2014/main" id="{61D9DC3D-7038-4887-98E3-3B0C7F5C9965}"/>
+              </a:ext>
+            </a:extLst>
+          </p:cNvPr>
+          <p:cNvSpPr>
+            <a:spLocks noGrp="1"/>
+          </p:cNvSpPr>
+          <p:nvPr>
+            <p:ph type="title"/>
+          </p:nvPr>
+        </p:nvSpPr>
+        <p:spPr/>
+        <p:txBody>
+          <a:bodyPr/>
+          <a:lstStyle/>
+          <a:p>
+            <a:r>
+              <a:rPr lang="en-CA" dirty="0"/>
+              <a:t>Finding Help in R</a:t>
+            </a:r>
+            <a:endParaRPr lang="en-US" dirty="0"/>
+          </a:p>
+        </p:txBody>
+      </p:sp>
+      <p:sp>
+        <p:nvSpPr>
+          <p:cNvPr id="3" name="Content Placeholder 2">
+            <a:extLst>
+              <a:ext uri="{FF2B5EF4-FFF2-40B4-BE49-F238E27FC236}">
+                <a16:creationId xmlns:a16="http://schemas.microsoft.com/office/drawing/2014/main" id="{8750FB0C-EF35-44A6-A643-F0776007D555}"/>
+              </a:ext>
+            </a:extLst>
+          </p:cNvPr>
+          <p:cNvSpPr>
+            <a:spLocks noGrp="1"/>
+          </p:cNvSpPr>
+          <p:nvPr>
+            <p:ph idx="1"/>
+          </p:nvPr>
+        </p:nvSpPr>
+        <p:spPr/>
+        <p:txBody>
+          <a:bodyPr>
+            <a:normAutofit fontScale="92500" lnSpcReduction="10000"/>
+          </a:bodyPr>
+          <a:lstStyle/>
+          <a:p>
+            <a:r>
+              <a:rPr lang="en-CA" dirty="0"/>
+              <a:t>R itself – typing ? before a function will open the help file</a:t>
+            </a:r>
+          </a:p>
+          <a:p>
+            <a:endParaRPr lang="en-CA" dirty="0"/>
+          </a:p>
+          <a:p>
+            <a:r>
+              <a:rPr lang="en-CA" dirty="0"/>
+              <a:t>Package website on CRAN, GitHub, or </a:t>
+            </a:r>
+            <a:r>
+              <a:rPr lang="en-CA" dirty="0" err="1"/>
+              <a:t>BitBucket</a:t>
+            </a:r>
+            <a:r>
+              <a:rPr lang="en-CA" dirty="0"/>
+              <a:t> – Packages often have vignettes that show you how to use them!</a:t>
+            </a:r>
+          </a:p>
+          <a:p>
+            <a:endParaRPr lang="en-CA" dirty="0"/>
+          </a:p>
+          <a:p>
+            <a:r>
+              <a:rPr lang="en-CA" dirty="0"/>
+              <a:t>Google – Stack Exchange and various blogs address many issues in R</a:t>
+            </a:r>
+          </a:p>
+          <a:p>
+            <a:endParaRPr lang="en-CA" dirty="0"/>
+          </a:p>
+          <a:p>
+            <a:r>
+              <a:rPr lang="en-CA" dirty="0"/>
+              <a:t>Twitter – the #</a:t>
+            </a:r>
+            <a:r>
+              <a:rPr lang="en-CA" dirty="0" err="1"/>
+              <a:t>rstats</a:t>
+            </a:r>
+            <a:r>
+              <a:rPr lang="en-CA" dirty="0"/>
+              <a:t> community is pretty friendly and responsive</a:t>
+            </a:r>
+          </a:p>
+          <a:p>
+            <a:endParaRPr lang="en-CA" dirty="0"/>
+          </a:p>
+          <a:p>
+            <a:r>
+              <a:rPr lang="en-CA" dirty="0"/>
+              <a:t>Books – check out the resources section at the end for some good ones</a:t>
+            </a:r>
+          </a:p>
+          <a:p>
+            <a:endParaRPr lang="en-CA" dirty="0"/>
+          </a:p>
+          <a:p>
+            <a:endParaRPr lang="en-US" dirty="0"/>
+          </a:p>
+        </p:txBody>
+      </p:sp>
+    </p:spTree>
+    <p:extLst>
+      <p:ext uri="{BB962C8B-B14F-4D97-AF65-F5344CB8AC3E}">
+        <p14:creationId xmlns:p14="http://schemas.microsoft.com/office/powerpoint/2010/main" val="2719216652"/>
+      </p:ext>
+    </p:extLst>
+  </p:cSld>
+  <p:clrMapOvr>
+    <a:masterClrMapping/>
+  </p:clrMapOvr>
+</p:sld>
+</file>
+
+<file path=ppt/slides/slide6.xml><?xml version="1.0" encoding="utf-8"?>
+<p:sld xmlns:a="http://schemas.openxmlformats.org/drawingml/2006/main" xmlns:r="http://schemas.openxmlformats.org/officeDocument/2006/relationships" xmlns:p="http://schemas.openxmlformats.org/presentationml/2006/main">
+  <p:cSld>
+    <p:spTree>
+      <p:nvGrpSpPr>
+        <p:cNvPr id="1" name=""/>
+        <p:cNvGrpSpPr/>
+        <p:nvPr/>
+      </p:nvGrpSpPr>
+      <p:grpSpPr>
+        <a:xfrm>
+          <a:off x="0" y="0"/>
+          <a:ext cx="0" cy="0"/>
+          <a:chOff x="0" y="0"/>
+          <a:chExt cx="0" cy="0"/>
+        </a:xfrm>
+      </p:grpSpPr>
+      <p:sp>
+        <p:nvSpPr>
+          <p:cNvPr id="2" name="Title 1">
+            <a:extLst>
+              <a:ext uri="{FF2B5EF4-FFF2-40B4-BE49-F238E27FC236}">
+                <a16:creationId xmlns:a16="http://schemas.microsoft.com/office/drawing/2014/main" id="{D0A8A79C-3C52-4246-888A-EA3533A1EDE3}"/>
+              </a:ext>
+            </a:extLst>
+          </p:cNvPr>
+          <p:cNvSpPr>
+            <a:spLocks noGrp="1"/>
+          </p:cNvSpPr>
+          <p:nvPr>
+            <p:ph type="title"/>
+          </p:nvPr>
+        </p:nvSpPr>
+        <p:spPr/>
+        <p:txBody>
+          <a:bodyPr/>
+          <a:lstStyle/>
+          <a:p>
+            <a:endParaRPr lang="en-US"/>
+          </a:p>
+        </p:txBody>
+      </p:sp>
+      <p:sp>
+        <p:nvSpPr>
+          <p:cNvPr id="3" name="Content Placeholder 2">
+            <a:extLst>
+              <a:ext uri="{FF2B5EF4-FFF2-40B4-BE49-F238E27FC236}">
+                <a16:creationId xmlns:a16="http://schemas.microsoft.com/office/drawing/2014/main" id="{E8C5BDBF-6AA1-48E1-9FF6-70D2D41B5971}"/>
+              </a:ext>
+            </a:extLst>
+          </p:cNvPr>
+          <p:cNvSpPr>
+            <a:spLocks noGrp="1"/>
+          </p:cNvSpPr>
+          <p:nvPr>
+            <p:ph idx="1"/>
+          </p:nvPr>
+        </p:nvSpPr>
+        <p:spPr/>
+        <p:txBody>
+          <a:bodyPr/>
+          <a:lstStyle/>
+          <a:p>
+            <a:endParaRPr lang="en-US"/>
+          </a:p>
+        </p:txBody>
+      </p:sp>
+    </p:spTree>
+    <p:extLst>
+      <p:ext uri="{BB962C8B-B14F-4D97-AF65-F5344CB8AC3E}">
+        <p14:creationId xmlns:p14="http://schemas.microsoft.com/office/powerpoint/2010/main" val="1319705431"/>
+      </p:ext>
+    </p:extLst>
+  </p:cSld>
+  <p:clrMapOvr>
+    <a:masterClrMapping/>
+  </p:clrMapOvr>
+</p:sld>
+</file>
+
+<file path=ppt/slides/slide7.xml><?xml version="1.0" encoding="utf-8"?>
+<p:sld xmlns:a="http://schemas.openxmlformats.org/drawingml/2006/main" xmlns:r="http://schemas.openxmlformats.org/officeDocument/2006/relationships" xmlns:p="http://schemas.openxmlformats.org/presentationml/2006/main">
+  <p:cSld>
+    <p:spTree>
+      <p:nvGrpSpPr>
+        <p:cNvPr id="1" name=""/>
+        <p:cNvGrpSpPr/>
+        <p:nvPr/>
+      </p:nvGrpSpPr>
+      <p:grpSpPr>
+        <a:xfrm>
+          <a:off x="0" y="0"/>
+          <a:ext cx="0" cy="0"/>
+          <a:chOff x="0" y="0"/>
+          <a:chExt cx="0" cy="0"/>
+        </a:xfrm>
+      </p:grpSpPr>
+      <p:sp>
+        <p:nvSpPr>
+          <p:cNvPr id="2" name="Title 1">
+            <a:extLst>
+              <a:ext uri="{FF2B5EF4-FFF2-40B4-BE49-F238E27FC236}">
+                <a16:creationId xmlns:a16="http://schemas.microsoft.com/office/drawing/2014/main" id="{494DEA53-3D56-4391-8250-31E77C4CD97D}"/>
+              </a:ext>
+            </a:extLst>
+          </p:cNvPr>
+          <p:cNvSpPr>
+            <a:spLocks noGrp="1"/>
+          </p:cNvSpPr>
+          <p:nvPr>
+            <p:ph type="title"/>
+          </p:nvPr>
+        </p:nvSpPr>
+        <p:spPr/>
+        <p:txBody>
+          <a:bodyPr/>
+          <a:lstStyle/>
+          <a:p>
+            <a:endParaRPr lang="en-US"/>
+          </a:p>
+        </p:txBody>
+      </p:sp>
+      <p:sp>
+        <p:nvSpPr>
+          <p:cNvPr id="3" name="Content Placeholder 2">
+            <a:extLst>
+              <a:ext uri="{FF2B5EF4-FFF2-40B4-BE49-F238E27FC236}">
+                <a16:creationId xmlns:a16="http://schemas.microsoft.com/office/drawing/2014/main" id="{D5876679-0D8E-46E7-9530-BE0FBC8B2420}"/>
+              </a:ext>
+            </a:extLst>
+          </p:cNvPr>
+          <p:cNvSpPr>
+            <a:spLocks noGrp="1"/>
+          </p:cNvSpPr>
+          <p:nvPr>
+            <p:ph idx="1"/>
+          </p:nvPr>
+        </p:nvSpPr>
+        <p:spPr/>
+        <p:txBody>
+          <a:bodyPr/>
+          <a:lstStyle/>
+          <a:p>
+            <a:endParaRPr lang="en-US"/>
+          </a:p>
+        </p:txBody>
+      </p:sp>
+    </p:spTree>
+    <p:extLst>
+      <p:ext uri="{BB962C8B-B14F-4D97-AF65-F5344CB8AC3E}">
+        <p14:creationId xmlns:p14="http://schemas.microsoft.com/office/powerpoint/2010/main" val="3989568792"/>
+      </p:ext>
+    </p:extLst>
+  </p:cSld>
+  <p:clrMapOvr>
+    <a:masterClrMapping/>
+  </p:clrMapOvr>
+</p:sld>
+</file>
+
+<file path=ppt/slides/slide8.xml><?xml version="1.0" encoding="utf-8"?>
+<p:sld xmlns:a="http://schemas.openxmlformats.org/drawingml/2006/main" xmlns:r="http://schemas.openxmlformats.org/officeDocument/2006/relationships" xmlns:p="http://schemas.openxmlformats.org/presentationml/2006/main">
+  <p:cSld>
+    <p:spTree>
+      <p:nvGrpSpPr>
+        <p:cNvPr id="1" name=""/>
+        <p:cNvGrpSpPr/>
+        <p:nvPr/>
+      </p:nvGrpSpPr>
+      <p:grpSpPr>
+        <a:xfrm>
+          <a:off x="0" y="0"/>
+          <a:ext cx="0" cy="0"/>
+          <a:chOff x="0" y="0"/>
+          <a:chExt cx="0" cy="0"/>
+        </a:xfrm>
+      </p:grpSpPr>
+      <p:sp>
+        <p:nvSpPr>
+          <p:cNvPr id="2" name="Title 1">
+            <a:extLst>
+              <a:ext uri="{FF2B5EF4-FFF2-40B4-BE49-F238E27FC236}">
+                <a16:creationId xmlns:a16="http://schemas.microsoft.com/office/drawing/2014/main" id="{36AC1023-7B18-4705-8424-B17B894F0250}"/>
+              </a:ext>
+            </a:extLst>
+          </p:cNvPr>
+          <p:cNvSpPr>
+            <a:spLocks noGrp="1"/>
+          </p:cNvSpPr>
+          <p:nvPr>
+            <p:ph type="title"/>
+          </p:nvPr>
+        </p:nvSpPr>
+        <p:spPr/>
+        <p:txBody>
+          <a:bodyPr/>
+          <a:lstStyle/>
+          <a:p>
+            <a:r>
+              <a:rPr lang="en-CA" dirty="0"/>
+              <a:t>Resources</a:t>
+            </a:r>
+            <a:endParaRPr lang="en-US" dirty="0"/>
+          </a:p>
+        </p:txBody>
+      </p:sp>
+      <p:sp>
+        <p:nvSpPr>
+          <p:cNvPr id="3" name="Content Placeholder 2">
+            <a:extLst>
+              <a:ext uri="{FF2B5EF4-FFF2-40B4-BE49-F238E27FC236}">
+                <a16:creationId xmlns:a16="http://schemas.microsoft.com/office/drawing/2014/main" id="{E32C73C2-8A9A-415C-9182-EDE714C2DF5D}"/>
+              </a:ext>
+            </a:extLst>
+          </p:cNvPr>
+          <p:cNvSpPr>
+            <a:spLocks noGrp="1"/>
+          </p:cNvSpPr>
+          <p:nvPr>
+            <p:ph idx="1"/>
+          </p:nvPr>
+        </p:nvSpPr>
+        <p:spPr>
+          <a:xfrm>
+            <a:off x="838200" y="1825625"/>
+            <a:ext cx="10515600" cy="4351338"/>
+          </a:xfrm>
+        </p:spPr>
+        <p:txBody>
+          <a:bodyPr>
+            <a:normAutofit/>
+          </a:bodyPr>
+          <a:lstStyle/>
+          <a:p>
+            <a:r>
+              <a:rPr lang="en-US" dirty="0"/>
+              <a:t>Burns. The R Inferno. https://www.burns-stat.com/pages/Tutor/R_inferno.pdf    </a:t>
+            </a:r>
+          </a:p>
+          <a:p>
+            <a:pPr lvl="1"/>
+            <a:r>
+              <a:rPr lang="en-US" dirty="0"/>
+              <a:t>Great resource that goes over common pitfalls that for the nine circles of R hell. Based loosely on Dante's Inferno.</a:t>
+            </a:r>
+          </a:p>
+          <a:p>
+            <a:r>
+              <a:rPr lang="en-US" dirty="0" err="1"/>
+              <a:t>Grolemund</a:t>
+            </a:r>
+            <a:r>
+              <a:rPr lang="en-US" dirty="0"/>
+              <a:t> &amp; Wickham. R for Data Science. https://r4ds.had.co.nz/    </a:t>
+            </a:r>
+          </a:p>
+          <a:p>
+            <a:pPr lvl="1"/>
+            <a:r>
+              <a:rPr lang="en-US" dirty="0"/>
+              <a:t>Solid resource for how to analyze data using R.</a:t>
+            </a:r>
+          </a:p>
+          <a:p>
+            <a:r>
+              <a:rPr lang="en-US" dirty="0"/>
+              <a:t>Long &amp; </a:t>
+            </a:r>
+            <a:r>
+              <a:rPr lang="en-US" dirty="0" err="1"/>
+              <a:t>Teetor</a:t>
+            </a:r>
+            <a:r>
+              <a:rPr lang="en-US" dirty="0"/>
+              <a:t>. R Cookbook. https://rc2e.com/    </a:t>
+            </a:r>
+          </a:p>
+          <a:p>
+            <a:pPr lvl="1"/>
+            <a:r>
+              <a:rPr lang="en-US" dirty="0"/>
+              <a:t>Solid resource for everything from using R to data visualization and statistics.</a:t>
+            </a:r>
+          </a:p>
+          <a:p>
+            <a:r>
+              <a:rPr lang="en-US" dirty="0"/>
+              <a:t>Wickham. Advanced R. http://adv-r.had.co.nz/    </a:t>
+            </a:r>
+          </a:p>
+          <a:p>
+            <a:pPr lvl="1"/>
+            <a:r>
+              <a:rPr lang="en-US" dirty="0"/>
+              <a:t>An excellent resource for those who want to start modifying R itself.</a:t>
+            </a:r>
+          </a:p>
+        </p:txBody>
+      </p:sp>
+    </p:spTree>
+    <p:extLst>
+      <p:ext uri="{BB962C8B-B14F-4D97-AF65-F5344CB8AC3E}">
+        <p14:creationId xmlns:p14="http://schemas.microsoft.com/office/powerpoint/2010/main" val="3253790593"/>
+      </p:ext>
+    </p:extLst>
+  </p:cSld>
+  <p:clrMapOvr>
+    <a:masterClrMapping/>
+  </p:clrMapOvr>
+</p:sld>
+</file>
+
 <file path=ppt/theme/theme1.xml><?xml version="1.0" encoding="utf-8"?>
 <a:theme xmlns:a="http://schemas.openxmlformats.org/drawingml/2006/main" name="Office Theme">
   <a:themeElements>

</xml_diff>